<commit_message>
Added dev stuff to powerpoint
screenshots of eclipse and emulator
</commit_message>
<xml_diff>
--- a/vers_cont_and_dev_env.pptx
+++ b/vers_cont_and_dev_env.pptx
@@ -1,6 +1,6 @@
 
 <file path=ppt/presentation.xml><?xml version="1.0" encoding="utf-8"?>
-<p:presentation xmlns:a="http://schemas.openxmlformats.org/drawingml/2006/main" xmlns:r="http://schemas.openxmlformats.org/officeDocument/2006/relationships" xmlns:mc="http://schemas.openxmlformats.org/markup-compatibility/2006" xmlns:mv="urn:schemas-microsoft-com:mac:vml" xmlns:p="http://schemas.openxmlformats.org/presentationml/2006/main" mc:Ignorable="mv" mc:PreserveAttributes="mv:*" saveSubsetFonts="1" autoCompressPictures="0">
+<p:presentation xmlns:a="http://schemas.openxmlformats.org/drawingml/2006/main" xmlns:r="http://schemas.openxmlformats.org/officeDocument/2006/relationships" xmlns:p="http://schemas.openxmlformats.org/presentationml/2006/main" saveSubsetFonts="1" autoCompressPictures="0">
   <p:sldMasterIdLst>
     <p:sldMasterId id="2147483648" r:id="rId1"/>
   </p:sldMasterIdLst>
@@ -111,11 +111,27 @@
       </a:defRPr>
     </a:lvl9pPr>
   </p:defaultTextStyle>
+  <p:extLst>
+    <p:ext uri="{EFAFB233-063F-42B5-8137-9DF3F51BA10A}">
+      <p15:sldGuideLst xmlns:p15="http://schemas.microsoft.com/office/powerpoint/2012/main">
+        <p15:guide id="1" orient="horz" pos="2160">
+          <p15:clr>
+            <a:srgbClr val="A4A3A4"/>
+          </p15:clr>
+        </p15:guide>
+        <p15:guide id="2" pos="2880">
+          <p15:clr>
+            <a:srgbClr val="A4A3A4"/>
+          </p15:clr>
+        </p15:guide>
+      </p15:sldGuideLst>
+    </p:ext>
+  </p:extLst>
 </p:presentation>
 </file>
 
 <file path=ppt/slideLayouts/slideLayout1.xml><?xml version="1.0" encoding="utf-8"?>
-<p:sldLayout xmlns:a="http://schemas.openxmlformats.org/drawingml/2006/main" xmlns:r="http://schemas.openxmlformats.org/officeDocument/2006/relationships" xmlns:mc="http://schemas.openxmlformats.org/markup-compatibility/2006" xmlns:mv="urn:schemas-microsoft-com:mac:vml" xmlns:p="http://schemas.openxmlformats.org/presentationml/2006/main" mc:Ignorable="mv" mc:PreserveAttributes="mv:*" type="title" preserve="1">
+<p:sldLayout xmlns:a="http://schemas.openxmlformats.org/drawingml/2006/main" xmlns:r="http://schemas.openxmlformats.org/officeDocument/2006/relationships" xmlns:p="http://schemas.openxmlformats.org/presentationml/2006/main" type="title" preserve="1">
   <p:cSld name="Title Slide">
     <p:spTree>
       <p:nvGrpSpPr>
@@ -295,7 +311,7 @@
           <a:p>
             <a:fld id="{E9DEDD08-EE9C-FB49-A359-5A833A6578F2}" type="datetimeFigureOut">
               <a:rPr lang="en-US" smtClean="0"/>
-              <a:t>2/6/14</a:t>
+              <a:t>2/6/2014</a:t>
             </a:fld>
             <a:endParaRPr lang="en-US"/>
           </a:p>
@@ -352,7 +368,7 @@
 </file>
 
 <file path=ppt/slideLayouts/slideLayout10.xml><?xml version="1.0" encoding="utf-8"?>
-<p:sldLayout xmlns:a="http://schemas.openxmlformats.org/drawingml/2006/main" xmlns:r="http://schemas.openxmlformats.org/officeDocument/2006/relationships" xmlns:mc="http://schemas.openxmlformats.org/markup-compatibility/2006" xmlns:mv="urn:schemas-microsoft-com:mac:vml" xmlns:p="http://schemas.openxmlformats.org/presentationml/2006/main" mc:Ignorable="mv" mc:PreserveAttributes="mv:*" type="vertTx" preserve="1">
+<p:sldLayout xmlns:a="http://schemas.openxmlformats.org/drawingml/2006/main" xmlns:r="http://schemas.openxmlformats.org/officeDocument/2006/relationships" xmlns:p="http://schemas.openxmlformats.org/presentationml/2006/main" type="vertTx" preserve="1">
   <p:cSld name="Title and Vertical Text">
     <p:spTree>
       <p:nvGrpSpPr>
@@ -460,7 +476,7 @@
           <a:p>
             <a:fld id="{E9DEDD08-EE9C-FB49-A359-5A833A6578F2}" type="datetimeFigureOut">
               <a:rPr lang="en-US" smtClean="0"/>
-              <a:t>2/6/14</a:t>
+              <a:t>2/6/2014</a:t>
             </a:fld>
             <a:endParaRPr lang="en-US"/>
           </a:p>
@@ -517,7 +533,7 @@
 </file>
 
 <file path=ppt/slideLayouts/slideLayout11.xml><?xml version="1.0" encoding="utf-8"?>
-<p:sldLayout xmlns:a="http://schemas.openxmlformats.org/drawingml/2006/main" xmlns:r="http://schemas.openxmlformats.org/officeDocument/2006/relationships" xmlns:mc="http://schemas.openxmlformats.org/markup-compatibility/2006" xmlns:mv="urn:schemas-microsoft-com:mac:vml" xmlns:p="http://schemas.openxmlformats.org/presentationml/2006/main" mc:Ignorable="mv" mc:PreserveAttributes="mv:*" type="vertTitleAndTx" preserve="1">
+<p:sldLayout xmlns:a="http://schemas.openxmlformats.org/drawingml/2006/main" xmlns:r="http://schemas.openxmlformats.org/officeDocument/2006/relationships" xmlns:p="http://schemas.openxmlformats.org/presentationml/2006/main" type="vertTitleAndTx" preserve="1">
   <p:cSld name="Vertical Title and Text">
     <p:spTree>
       <p:nvGrpSpPr>
@@ -635,7 +651,7 @@
           <a:p>
             <a:fld id="{E9DEDD08-EE9C-FB49-A359-5A833A6578F2}" type="datetimeFigureOut">
               <a:rPr lang="en-US" smtClean="0"/>
-              <a:t>2/6/14</a:t>
+              <a:t>2/6/2014</a:t>
             </a:fld>
             <a:endParaRPr lang="en-US"/>
           </a:p>
@@ -692,7 +708,7 @@
 </file>
 
 <file path=ppt/slideLayouts/slideLayout2.xml><?xml version="1.0" encoding="utf-8"?>
-<p:sldLayout xmlns:a="http://schemas.openxmlformats.org/drawingml/2006/main" xmlns:r="http://schemas.openxmlformats.org/officeDocument/2006/relationships" xmlns:mc="http://schemas.openxmlformats.org/markup-compatibility/2006" xmlns:mv="urn:schemas-microsoft-com:mac:vml" xmlns:p="http://schemas.openxmlformats.org/presentationml/2006/main" mc:Ignorable="mv" mc:PreserveAttributes="mv:*" type="obj" preserve="1">
+<p:sldLayout xmlns:a="http://schemas.openxmlformats.org/drawingml/2006/main" xmlns:r="http://schemas.openxmlformats.org/officeDocument/2006/relationships" xmlns:p="http://schemas.openxmlformats.org/presentationml/2006/main" type="obj" preserve="1">
   <p:cSld name="Title and Content">
     <p:spTree>
       <p:nvGrpSpPr>
@@ -800,7 +816,7 @@
           <a:p>
             <a:fld id="{E9DEDD08-EE9C-FB49-A359-5A833A6578F2}" type="datetimeFigureOut">
               <a:rPr lang="en-US" smtClean="0"/>
-              <a:t>2/6/14</a:t>
+              <a:t>2/6/2014</a:t>
             </a:fld>
             <a:endParaRPr lang="en-US"/>
           </a:p>
@@ -857,7 +873,7 @@
 </file>
 
 <file path=ppt/slideLayouts/slideLayout3.xml><?xml version="1.0" encoding="utf-8"?>
-<p:sldLayout xmlns:a="http://schemas.openxmlformats.org/drawingml/2006/main" xmlns:r="http://schemas.openxmlformats.org/officeDocument/2006/relationships" xmlns:mc="http://schemas.openxmlformats.org/markup-compatibility/2006" xmlns:mv="urn:schemas-microsoft-com:mac:vml" xmlns:p="http://schemas.openxmlformats.org/presentationml/2006/main" mc:Ignorable="mv" mc:PreserveAttributes="mv:*" type="secHead" preserve="1">
+<p:sldLayout xmlns:a="http://schemas.openxmlformats.org/drawingml/2006/main" xmlns:r="http://schemas.openxmlformats.org/officeDocument/2006/relationships" xmlns:p="http://schemas.openxmlformats.org/presentationml/2006/main" type="secHead" preserve="1">
   <p:cSld name="Section Header">
     <p:spTree>
       <p:nvGrpSpPr>
@@ -1041,7 +1057,7 @@
           <a:p>
             <a:fld id="{E9DEDD08-EE9C-FB49-A359-5A833A6578F2}" type="datetimeFigureOut">
               <a:rPr lang="en-US" smtClean="0"/>
-              <a:t>2/6/14</a:t>
+              <a:t>2/6/2014</a:t>
             </a:fld>
             <a:endParaRPr lang="en-US"/>
           </a:p>
@@ -1098,7 +1114,7 @@
 </file>
 
 <file path=ppt/slideLayouts/slideLayout4.xml><?xml version="1.0" encoding="utf-8"?>
-<p:sldLayout xmlns:a="http://schemas.openxmlformats.org/drawingml/2006/main" xmlns:r="http://schemas.openxmlformats.org/officeDocument/2006/relationships" xmlns:mc="http://schemas.openxmlformats.org/markup-compatibility/2006" xmlns:mv="urn:schemas-microsoft-com:mac:vml" xmlns:p="http://schemas.openxmlformats.org/presentationml/2006/main" mc:Ignorable="mv" mc:PreserveAttributes="mv:*" type="twoObj" preserve="1">
+<p:sldLayout xmlns:a="http://schemas.openxmlformats.org/drawingml/2006/main" xmlns:r="http://schemas.openxmlformats.org/officeDocument/2006/relationships" xmlns:p="http://schemas.openxmlformats.org/presentationml/2006/main" type="twoObj" preserve="1">
   <p:cSld name="Two Content">
     <p:spTree>
       <p:nvGrpSpPr>
@@ -1324,7 +1340,7 @@
           <a:p>
             <a:fld id="{E9DEDD08-EE9C-FB49-A359-5A833A6578F2}" type="datetimeFigureOut">
               <a:rPr lang="en-US" smtClean="0"/>
-              <a:t>2/6/14</a:t>
+              <a:t>2/6/2014</a:t>
             </a:fld>
             <a:endParaRPr lang="en-US"/>
           </a:p>
@@ -1381,7 +1397,7 @@
 </file>
 
 <file path=ppt/slideLayouts/slideLayout5.xml><?xml version="1.0" encoding="utf-8"?>
-<p:sldLayout xmlns:a="http://schemas.openxmlformats.org/drawingml/2006/main" xmlns:r="http://schemas.openxmlformats.org/officeDocument/2006/relationships" xmlns:mc="http://schemas.openxmlformats.org/markup-compatibility/2006" xmlns:mv="urn:schemas-microsoft-com:mac:vml" xmlns:p="http://schemas.openxmlformats.org/presentationml/2006/main" mc:Ignorable="mv" mc:PreserveAttributes="mv:*" type="twoTxTwoObj" preserve="1">
+<p:sldLayout xmlns:a="http://schemas.openxmlformats.org/drawingml/2006/main" xmlns:r="http://schemas.openxmlformats.org/officeDocument/2006/relationships" xmlns:p="http://schemas.openxmlformats.org/presentationml/2006/main" type="twoTxTwoObj" preserve="1">
   <p:cSld name="Comparison">
     <p:spTree>
       <p:nvGrpSpPr>
@@ -1741,7 +1757,7 @@
           <a:p>
             <a:fld id="{E9DEDD08-EE9C-FB49-A359-5A833A6578F2}" type="datetimeFigureOut">
               <a:rPr lang="en-US" smtClean="0"/>
-              <a:t>2/6/14</a:t>
+              <a:t>2/6/2014</a:t>
             </a:fld>
             <a:endParaRPr lang="en-US"/>
           </a:p>
@@ -1798,7 +1814,7 @@
 </file>
 
 <file path=ppt/slideLayouts/slideLayout6.xml><?xml version="1.0" encoding="utf-8"?>
-<p:sldLayout xmlns:a="http://schemas.openxmlformats.org/drawingml/2006/main" xmlns:r="http://schemas.openxmlformats.org/officeDocument/2006/relationships" xmlns:mc="http://schemas.openxmlformats.org/markup-compatibility/2006" xmlns:mv="urn:schemas-microsoft-com:mac:vml" xmlns:p="http://schemas.openxmlformats.org/presentationml/2006/main" mc:Ignorable="mv" mc:PreserveAttributes="mv:*" type="titleOnly" preserve="1">
+<p:sldLayout xmlns:a="http://schemas.openxmlformats.org/drawingml/2006/main" xmlns:r="http://schemas.openxmlformats.org/officeDocument/2006/relationships" xmlns:p="http://schemas.openxmlformats.org/presentationml/2006/main" type="titleOnly" preserve="1">
   <p:cSld name="Title Only">
     <p:spTree>
       <p:nvGrpSpPr>
@@ -1854,7 +1870,7 @@
           <a:p>
             <a:fld id="{E9DEDD08-EE9C-FB49-A359-5A833A6578F2}" type="datetimeFigureOut">
               <a:rPr lang="en-US" smtClean="0"/>
-              <a:t>2/6/14</a:t>
+              <a:t>2/6/2014</a:t>
             </a:fld>
             <a:endParaRPr lang="en-US"/>
           </a:p>
@@ -1911,7 +1927,7 @@
 </file>
 
 <file path=ppt/slideLayouts/slideLayout7.xml><?xml version="1.0" encoding="utf-8"?>
-<p:sldLayout xmlns:a="http://schemas.openxmlformats.org/drawingml/2006/main" xmlns:r="http://schemas.openxmlformats.org/officeDocument/2006/relationships" xmlns:mc="http://schemas.openxmlformats.org/markup-compatibility/2006" xmlns:mv="urn:schemas-microsoft-com:mac:vml" xmlns:p="http://schemas.openxmlformats.org/presentationml/2006/main" mc:Ignorable="mv" mc:PreserveAttributes="mv:*" type="blank" preserve="1">
+<p:sldLayout xmlns:a="http://schemas.openxmlformats.org/drawingml/2006/main" xmlns:r="http://schemas.openxmlformats.org/officeDocument/2006/relationships" xmlns:p="http://schemas.openxmlformats.org/presentationml/2006/main" type="blank" preserve="1">
   <p:cSld name="Blank">
     <p:spTree>
       <p:nvGrpSpPr>
@@ -1944,7 +1960,7 @@
           <a:p>
             <a:fld id="{E9DEDD08-EE9C-FB49-A359-5A833A6578F2}" type="datetimeFigureOut">
               <a:rPr lang="en-US" smtClean="0"/>
-              <a:t>2/6/14</a:t>
+              <a:t>2/6/2014</a:t>
             </a:fld>
             <a:endParaRPr lang="en-US"/>
           </a:p>
@@ -2001,7 +2017,7 @@
 </file>
 
 <file path=ppt/slideLayouts/slideLayout8.xml><?xml version="1.0" encoding="utf-8"?>
-<p:sldLayout xmlns:a="http://schemas.openxmlformats.org/drawingml/2006/main" xmlns:r="http://schemas.openxmlformats.org/officeDocument/2006/relationships" xmlns:mc="http://schemas.openxmlformats.org/markup-compatibility/2006" xmlns:mv="urn:schemas-microsoft-com:mac:vml" xmlns:p="http://schemas.openxmlformats.org/presentationml/2006/main" mc:Ignorable="mv" mc:PreserveAttributes="mv:*" type="objTx" preserve="1">
+<p:sldLayout xmlns:a="http://schemas.openxmlformats.org/drawingml/2006/main" xmlns:r="http://schemas.openxmlformats.org/officeDocument/2006/relationships" xmlns:p="http://schemas.openxmlformats.org/presentationml/2006/main" type="objTx" preserve="1">
   <p:cSld name="Content with Caption">
     <p:spTree>
       <p:nvGrpSpPr>
@@ -2216,7 +2232,7 @@
           <a:p>
             <a:fld id="{E9DEDD08-EE9C-FB49-A359-5A833A6578F2}" type="datetimeFigureOut">
               <a:rPr lang="en-US" smtClean="0"/>
-              <a:t>2/6/14</a:t>
+              <a:t>2/6/2014</a:t>
             </a:fld>
             <a:endParaRPr lang="en-US"/>
           </a:p>
@@ -2273,7 +2289,7 @@
 </file>
 
 <file path=ppt/slideLayouts/slideLayout9.xml><?xml version="1.0" encoding="utf-8"?>
-<p:sldLayout xmlns:a="http://schemas.openxmlformats.org/drawingml/2006/main" xmlns:r="http://schemas.openxmlformats.org/officeDocument/2006/relationships" xmlns:mc="http://schemas.openxmlformats.org/markup-compatibility/2006" xmlns:mv="urn:schemas-microsoft-com:mac:vml" xmlns:p="http://schemas.openxmlformats.org/presentationml/2006/main" mc:Ignorable="mv" mc:PreserveAttributes="mv:*" type="picTx" preserve="1">
+<p:sldLayout xmlns:a="http://schemas.openxmlformats.org/drawingml/2006/main" xmlns:r="http://schemas.openxmlformats.org/officeDocument/2006/relationships" xmlns:p="http://schemas.openxmlformats.org/presentationml/2006/main" type="picTx" preserve="1">
   <p:cSld name="Picture with Caption">
     <p:spTree>
       <p:nvGrpSpPr>
@@ -2464,7 +2480,7 @@
           <a:p>
             <a:fld id="{E9DEDD08-EE9C-FB49-A359-5A833A6578F2}" type="datetimeFigureOut">
               <a:rPr lang="en-US" smtClean="0"/>
-              <a:t>2/6/14</a:t>
+              <a:t>2/6/2014</a:t>
             </a:fld>
             <a:endParaRPr lang="en-US"/>
           </a:p>
@@ -2521,7 +2537,7 @@
 </file>
 
 <file path=ppt/slideMasters/slideMaster1.xml><?xml version="1.0" encoding="utf-8"?>
-<p:sldMaster xmlns:a="http://schemas.openxmlformats.org/drawingml/2006/main" xmlns:r="http://schemas.openxmlformats.org/officeDocument/2006/relationships" xmlns:mc="http://schemas.openxmlformats.org/markup-compatibility/2006" xmlns:mv="urn:schemas-microsoft-com:mac:vml" xmlns:p="http://schemas.openxmlformats.org/presentationml/2006/main" mc:Ignorable="mv" mc:PreserveAttributes="mv:*">
+<p:sldMaster xmlns:a="http://schemas.openxmlformats.org/drawingml/2006/main" xmlns:r="http://schemas.openxmlformats.org/officeDocument/2006/relationships" xmlns:p="http://schemas.openxmlformats.org/presentationml/2006/main">
   <p:cSld>
     <p:bg>
       <p:bgRef idx="1001">
@@ -2672,7 +2688,7 @@
           <a:p>
             <a:fld id="{E9DEDD08-EE9C-FB49-A359-5A833A6578F2}" type="datetimeFigureOut">
               <a:rPr lang="en-US" smtClean="0"/>
-              <a:t>2/6/14</a:t>
+              <a:t>2/6/2014</a:t>
             </a:fld>
             <a:endParaRPr lang="en-US"/>
           </a:p>
@@ -3026,7 +3042,7 @@
 </file>
 
 <file path=ppt/slides/slide1.xml><?xml version="1.0" encoding="utf-8"?>
-<p:sld xmlns:a="http://schemas.openxmlformats.org/drawingml/2006/main" xmlns:r="http://schemas.openxmlformats.org/officeDocument/2006/relationships" xmlns:mc="http://schemas.openxmlformats.org/markup-compatibility/2006" xmlns:mv="urn:schemas-microsoft-com:mac:vml" xmlns:p="http://schemas.openxmlformats.org/presentationml/2006/main" mc:Ignorable="mv" mc:PreserveAttributes="mv:*">
+<p:sld xmlns:a="http://schemas.openxmlformats.org/drawingml/2006/main" xmlns:r="http://schemas.openxmlformats.org/officeDocument/2006/relationships" xmlns:p="http://schemas.openxmlformats.org/presentationml/2006/main">
   <p:cSld>
     <p:spTree>
       <p:nvGrpSpPr>
@@ -3136,7 +3152,7 @@
 </file>
 
 <file path=ppt/slides/slide2.xml><?xml version="1.0" encoding="utf-8"?>
-<p:sld xmlns:a="http://schemas.openxmlformats.org/drawingml/2006/main" xmlns:r="http://schemas.openxmlformats.org/officeDocument/2006/relationships" xmlns:mc="http://schemas.openxmlformats.org/markup-compatibility/2006" xmlns:mv="urn:schemas-microsoft-com:mac:vml" xmlns:p="http://schemas.openxmlformats.org/presentationml/2006/main" mc:Ignorable="mv" mc:PreserveAttributes="mv:*">
+<p:sld xmlns:a="http://schemas.openxmlformats.org/drawingml/2006/main" xmlns:r="http://schemas.openxmlformats.org/officeDocument/2006/relationships" xmlns:p="http://schemas.openxmlformats.org/presentationml/2006/main">
   <p:cSld>
     <p:spTree>
       <p:nvGrpSpPr>
@@ -3175,25 +3191,30 @@
           </a:p>
         </p:txBody>
       </p:sp>
-      <p:sp>
-        <p:nvSpPr>
-          <p:cNvPr id="3" name="Content Placeholder 2"/>
-          <p:cNvSpPr>
-            <a:spLocks noGrp="1"/>
-          </p:cNvSpPr>
-          <p:nvPr>
-            <p:ph idx="1"/>
-          </p:nvPr>
-        </p:nvSpPr>
-        <p:spPr/>
-        <p:txBody>
-          <a:bodyPr/>
-          <a:lstStyle/>
-          <a:p>
-            <a:endParaRPr lang="en-US"/>
-          </a:p>
-        </p:txBody>
-      </p:sp>
+      <p:pic>
+        <p:nvPicPr>
+          <p:cNvPr id="4" name="Picture 3"/>
+          <p:cNvPicPr>
+            <a:picLocks noChangeAspect="1"/>
+          </p:cNvPicPr>
+          <p:nvPr/>
+        </p:nvPicPr>
+        <p:blipFill>
+          <a:blip r:embed="rId2"/>
+          <a:stretch>
+            <a:fillRect/>
+          </a:stretch>
+        </p:blipFill>
+        <p:spPr>
+          <a:xfrm>
+            <a:off x="730811" y="1674252"/>
+            <a:ext cx="7682377" cy="4321337"/>
+          </a:xfrm>
+          <a:prstGeom prst="rect">
+            <a:avLst/>
+          </a:prstGeom>
+        </p:spPr>
+      </p:pic>
     </p:spTree>
   </p:cSld>
   <p:clrMapOvr>
@@ -3203,7 +3224,7 @@
 </file>
 
 <file path=ppt/slides/slide3.xml><?xml version="1.0" encoding="utf-8"?>
-<p:sld xmlns:a="http://schemas.openxmlformats.org/drawingml/2006/main" xmlns:r="http://schemas.openxmlformats.org/officeDocument/2006/relationships" xmlns:mc="http://schemas.openxmlformats.org/markup-compatibility/2006" xmlns:mv="urn:schemas-microsoft-com:mac:vml" xmlns:p="http://schemas.openxmlformats.org/presentationml/2006/main" mc:Ignorable="mv" mc:PreserveAttributes="mv:*">
+<p:sld xmlns:a="http://schemas.openxmlformats.org/drawingml/2006/main" xmlns:r="http://schemas.openxmlformats.org/officeDocument/2006/relationships" xmlns:p="http://schemas.openxmlformats.org/presentationml/2006/main">
   <p:cSld>
     <p:spTree>
       <p:nvGrpSpPr>
@@ -3242,25 +3263,36 @@
           </a:p>
         </p:txBody>
       </p:sp>
-      <p:sp>
-        <p:nvSpPr>
-          <p:cNvPr id="3" name="Content Placeholder 2"/>
-          <p:cNvSpPr>
-            <a:spLocks noGrp="1"/>
-          </p:cNvSpPr>
-          <p:nvPr>
-            <p:ph idx="1"/>
-          </p:nvPr>
-        </p:nvSpPr>
-        <p:spPr/>
-        <p:txBody>
-          <a:bodyPr/>
-          <a:lstStyle/>
-          <a:p>
-            <a:endParaRPr lang="en-US"/>
-          </a:p>
-        </p:txBody>
-      </p:sp>
+      <p:pic>
+        <p:nvPicPr>
+          <p:cNvPr id="4" name="Picture 3"/>
+          <p:cNvPicPr>
+            <a:picLocks noChangeAspect="1"/>
+          </p:cNvPicPr>
+          <p:nvPr/>
+        </p:nvPicPr>
+        <p:blipFill>
+          <a:blip r:embed="rId2">
+            <a:extLst>
+              <a:ext uri="{28A0092B-C50C-407E-A947-70E740481C1C}">
+                <a14:useLocalDpi xmlns:a14="http://schemas.microsoft.com/office/drawing/2010/main" val="0"/>
+              </a:ext>
+            </a:extLst>
+          </a:blip>
+          <a:stretch>
+            <a:fillRect/>
+          </a:stretch>
+        </p:blipFill>
+        <p:spPr>
+          <a:xfrm>
+            <a:off x="2674608" y="1417638"/>
+            <a:ext cx="4365722" cy="5440361"/>
+          </a:xfrm>
+          <a:prstGeom prst="rect">
+            <a:avLst/>
+          </a:prstGeom>
+        </p:spPr>
+      </p:pic>
     </p:spTree>
   </p:cSld>
   <p:clrMapOvr>
@@ -3270,7 +3302,7 @@
 </file>
 
 <file path=ppt/slides/slide4.xml><?xml version="1.0" encoding="utf-8"?>
-<p:sld xmlns:a="http://schemas.openxmlformats.org/drawingml/2006/main" xmlns:r="http://schemas.openxmlformats.org/officeDocument/2006/relationships" xmlns:mc="http://schemas.openxmlformats.org/markup-compatibility/2006" xmlns:mv="urn:schemas-microsoft-com:mac:vml" xmlns:p="http://schemas.openxmlformats.org/presentationml/2006/main" mc:Ignorable="mv" mc:PreserveAttributes="mv:*">
+<p:sld xmlns:a="http://schemas.openxmlformats.org/drawingml/2006/main" xmlns:r="http://schemas.openxmlformats.org/officeDocument/2006/relationships" xmlns:p="http://schemas.openxmlformats.org/presentationml/2006/main">
   <p:cSld>
     <p:spTree>
       <p:nvGrpSpPr>
@@ -3309,25 +3341,36 @@
           </a:p>
         </p:txBody>
       </p:sp>
-      <p:sp>
-        <p:nvSpPr>
-          <p:cNvPr id="3" name="Content Placeholder 2"/>
-          <p:cNvSpPr>
-            <a:spLocks noGrp="1"/>
-          </p:cNvSpPr>
-          <p:nvPr>
-            <p:ph idx="1"/>
-          </p:nvPr>
-        </p:nvSpPr>
-        <p:spPr/>
-        <p:txBody>
-          <a:bodyPr/>
-          <a:lstStyle/>
-          <a:p>
-            <a:endParaRPr lang="en-US"/>
-          </a:p>
-        </p:txBody>
-      </p:sp>
+      <p:pic>
+        <p:nvPicPr>
+          <p:cNvPr id="4" name="Picture 3"/>
+          <p:cNvPicPr>
+            <a:picLocks noChangeAspect="1"/>
+          </p:cNvPicPr>
+          <p:nvPr/>
+        </p:nvPicPr>
+        <p:blipFill>
+          <a:blip r:embed="rId2">
+            <a:extLst>
+              <a:ext uri="{28A0092B-C50C-407E-A947-70E740481C1C}">
+                <a14:useLocalDpi xmlns:a14="http://schemas.microsoft.com/office/drawing/2010/main" val="0"/>
+              </a:ext>
+            </a:extLst>
+          </a:blip>
+          <a:stretch>
+            <a:fillRect/>
+          </a:stretch>
+        </p:blipFill>
+        <p:spPr>
+          <a:xfrm>
+            <a:off x="2433178" y="1171977"/>
+            <a:ext cx="4495656" cy="5539670"/>
+          </a:xfrm>
+          <a:prstGeom prst="rect">
+            <a:avLst/>
+          </a:prstGeom>
+        </p:spPr>
+      </p:pic>
     </p:spTree>
   </p:cSld>
   <p:clrMapOvr>
@@ -3337,7 +3380,7 @@
 </file>
 
 <file path=ppt/slides/slide5.xml><?xml version="1.0" encoding="utf-8"?>
-<p:sld xmlns:a="http://schemas.openxmlformats.org/drawingml/2006/main" xmlns:r="http://schemas.openxmlformats.org/officeDocument/2006/relationships" xmlns:mc="http://schemas.openxmlformats.org/markup-compatibility/2006" xmlns:mv="urn:schemas-microsoft-com:mac:vml" xmlns:p="http://schemas.openxmlformats.org/presentationml/2006/main" mc:Ignorable="mv" mc:PreserveAttributes="mv:*">
+<p:sld xmlns:a="http://schemas.openxmlformats.org/drawingml/2006/main" xmlns:r="http://schemas.openxmlformats.org/officeDocument/2006/relationships" xmlns:p="http://schemas.openxmlformats.org/presentationml/2006/main">
   <p:cSld>
     <p:spTree>
       <p:nvGrpSpPr>
@@ -3407,6 +3450,14 @@
           </a:p>
           <a:p>
             <a:pPr lvl="1"/>
+            <a:r>
+              <a:rPr lang="en-US" dirty="0" smtClean="0"/>
+              <a:t>Source </a:t>
+            </a:r>
+            <a:r>
+              <a:rPr lang="en-US" smtClean="0"/>
+              <a:t>Code Folder</a:t>
+            </a:r>
             <a:endParaRPr lang="en-US" dirty="0" smtClean="0"/>
           </a:p>
           <a:p>
@@ -3475,7 +3526,7 @@
 </file>
 
 <file path=ppt/slides/slide6.xml><?xml version="1.0" encoding="utf-8"?>
-<p:sld xmlns:a="http://schemas.openxmlformats.org/drawingml/2006/main" xmlns:r="http://schemas.openxmlformats.org/officeDocument/2006/relationships" xmlns:mc="http://schemas.openxmlformats.org/markup-compatibility/2006" xmlns:mv="urn:schemas-microsoft-com:mac:vml" xmlns:p="http://schemas.openxmlformats.org/presentationml/2006/main" mc:Ignorable="mv" mc:PreserveAttributes="mv:*">
+<p:sld xmlns:a="http://schemas.openxmlformats.org/drawingml/2006/main" xmlns:r="http://schemas.openxmlformats.org/officeDocument/2006/relationships" xmlns:p="http://schemas.openxmlformats.org/presentationml/2006/main">
   <p:cSld>
     <p:spTree>
       <p:nvGrpSpPr>
@@ -3595,7 +3646,7 @@
 </file>
 
 <file path=ppt/slides/slide7.xml><?xml version="1.0" encoding="utf-8"?>
-<p:sld xmlns:a="http://schemas.openxmlformats.org/drawingml/2006/main" xmlns:r="http://schemas.openxmlformats.org/officeDocument/2006/relationships" xmlns:mc="http://schemas.openxmlformats.org/markup-compatibility/2006" xmlns:mv="urn:schemas-microsoft-com:mac:vml" xmlns:p="http://schemas.openxmlformats.org/presentationml/2006/main" mc:Ignorable="mv" mc:PreserveAttributes="mv:*">
+<p:sld xmlns:a="http://schemas.openxmlformats.org/drawingml/2006/main" xmlns:r="http://schemas.openxmlformats.org/officeDocument/2006/relationships" xmlns:p="http://schemas.openxmlformats.org/presentationml/2006/main">
   <p:cSld>
     <p:spTree>
       <p:nvGrpSpPr>
@@ -3662,7 +3713,7 @@
 </file>
 
 <file path=ppt/slides/slide8.xml><?xml version="1.0" encoding="utf-8"?>
-<p:sld xmlns:a="http://schemas.openxmlformats.org/drawingml/2006/main" xmlns:r="http://schemas.openxmlformats.org/officeDocument/2006/relationships" xmlns:mc="http://schemas.openxmlformats.org/markup-compatibility/2006" xmlns:mv="urn:schemas-microsoft-com:mac:vml" xmlns:p="http://schemas.openxmlformats.org/presentationml/2006/main" mc:Ignorable="mv" mc:PreserveAttributes="mv:*">
+<p:sld xmlns:a="http://schemas.openxmlformats.org/drawingml/2006/main" xmlns:r="http://schemas.openxmlformats.org/officeDocument/2006/relationships" xmlns:p="http://schemas.openxmlformats.org/presentationml/2006/main">
   <p:cSld>
     <p:spTree>
       <p:nvGrpSpPr>

</xml_diff>